<commit_message>
notification code for Android 8.0 + added
</commit_message>
<xml_diff>
--- a/Android Day10.pptx
+++ b/Android Day10.pptx
@@ -5,28 +5,27 @@
     <p:sldMasterId id="2147483697" r:id="rId1"/>
   </p:sldMasterIdLst>
   <p:notesMasterIdLst>
-    <p:notesMasterId r:id="rId18"/>
+    <p:notesMasterId r:id="rId17"/>
   </p:notesMasterIdLst>
   <p:handoutMasterIdLst>
-    <p:handoutMasterId r:id="rId19"/>
+    <p:handoutMasterId r:id="rId18"/>
   </p:handoutMasterIdLst>
   <p:sldIdLst>
     <p:sldId id="256" r:id="rId2"/>
     <p:sldId id="294" r:id="rId3"/>
     <p:sldId id="286" r:id="rId4"/>
     <p:sldId id="342" r:id="rId5"/>
-    <p:sldId id="357" r:id="rId6"/>
-    <p:sldId id="361" r:id="rId7"/>
-    <p:sldId id="362" r:id="rId8"/>
-    <p:sldId id="363" r:id="rId9"/>
-    <p:sldId id="364" r:id="rId10"/>
-    <p:sldId id="365" r:id="rId11"/>
-    <p:sldId id="366" r:id="rId12"/>
-    <p:sldId id="367" r:id="rId13"/>
-    <p:sldId id="369" r:id="rId14"/>
-    <p:sldId id="368" r:id="rId15"/>
-    <p:sldId id="370" r:id="rId16"/>
-    <p:sldId id="290" r:id="rId17"/>
+    <p:sldId id="361" r:id="rId6"/>
+    <p:sldId id="362" r:id="rId7"/>
+    <p:sldId id="363" r:id="rId8"/>
+    <p:sldId id="364" r:id="rId9"/>
+    <p:sldId id="365" r:id="rId10"/>
+    <p:sldId id="366" r:id="rId11"/>
+    <p:sldId id="367" r:id="rId12"/>
+    <p:sldId id="369" r:id="rId13"/>
+    <p:sldId id="368" r:id="rId14"/>
+    <p:sldId id="370" r:id="rId15"/>
+    <p:sldId id="290" r:id="rId16"/>
   </p:sldIdLst>
   <p:sldSz cx="9144000" cy="5143500" type="screen16x9"/>
   <p:notesSz cx="6858000" cy="9144000"/>
@@ -1743,7 +1742,7 @@
           <a:p>
             <a:fld id="{D7CD6017-FECC-4565-B4A9-CDF40B8AFEC4}" type="datetimeFigureOut">
               <a:rPr lang="en-IN" smtClean="0"/>
-              <a:t>27/06/19</a:t>
+              <a:t>28/06/19</a:t>
             </a:fld>
             <a:endParaRPr lang="en-IN"/>
           </a:p>
@@ -1921,7 +1920,7 @@
           <a:p>
             <a:fld id="{9F3C1A20-E642-F347-A89C-E093F8996D44}" type="datetimeFigureOut">
               <a:rPr lang="en-US" smtClean="0"/>
-              <a:t>6/27/19</a:t>
+              <a:t>6/28/19</a:t>
             </a:fld>
             <a:endParaRPr lang="en-US"/>
           </a:p>
@@ -2441,7 +2440,7 @@
           <a:p>
             <a:fld id="{C65558FE-7BAE-4F41-B1DE-C9E081343886}" type="datetime1">
               <a:rPr lang="en-IN" smtClean="0"/>
-              <a:t>27/06/19</a:t>
+              <a:t>28/06/19</a:t>
             </a:fld>
             <a:endParaRPr lang="en-IN" dirty="0"/>
           </a:p>
@@ -2658,7 +2657,7 @@
           <a:p>
             <a:fld id="{C546BFA6-7020-A842-AFE3-43A763B8DE0A}" type="datetime1">
               <a:rPr lang="en-IN" smtClean="0"/>
-              <a:t>27/06/19</a:t>
+              <a:t>28/06/19</a:t>
             </a:fld>
             <a:endParaRPr lang="en-IN"/>
           </a:p>
@@ -3902,7 +3901,7 @@
           <a:p>
             <a:fld id="{24A60580-2B70-6940-B3F0-E4F8AB7AA3B6}" type="datetime1">
               <a:rPr lang="en-IN" smtClean="0"/>
-              <a:t>27/06/19</a:t>
+              <a:t>28/06/19</a:t>
             </a:fld>
             <a:endParaRPr lang="en-IN"/>
           </a:p>
@@ -4134,7 +4133,7 @@
           <a:p>
             <a:fld id="{2FB0970A-5D49-E646-889A-E8EA6023EA9A}" type="datetime1">
               <a:rPr lang="en-IN" smtClean="0"/>
-              <a:t>27/06/19</a:t>
+              <a:t>28/06/19</a:t>
             </a:fld>
             <a:endParaRPr lang="en-IN"/>
           </a:p>
@@ -4979,7 +4978,7 @@
           <a:p>
             <a:fld id="{60F6970B-5F9F-1C49-823B-784ECC0F8F74}" type="datetime1">
               <a:rPr lang="en-IN" smtClean="0"/>
-              <a:t>27/06/19</a:t>
+              <a:t>28/06/19</a:t>
             </a:fld>
             <a:endParaRPr lang="en-IN"/>
           </a:p>
@@ -5567,7 +5566,7 @@
           <a:p>
             <a:fld id="{04CF2939-C6E8-734E-A964-0558AE677560}" type="datetime1">
               <a:rPr lang="en-IN" smtClean="0"/>
-              <a:t>27/06/19</a:t>
+              <a:t>28/06/19</a:t>
             </a:fld>
             <a:endParaRPr lang="en-IN"/>
           </a:p>
@@ -6827,7 +6826,7 @@
           <a:p>
             <a:fld id="{55E1E18D-3351-C242-BAA6-DD72A5C1D791}" type="datetime1">
               <a:rPr lang="en-IN" smtClean="0"/>
-              <a:t>27/06/19</a:t>
+              <a:t>28/06/19</a:t>
             </a:fld>
             <a:endParaRPr lang="en-IN"/>
           </a:p>
@@ -6900,7 +6899,7 @@
           <a:noFill/>
           <a:extLst>
             <a:ext uri="{909E8E84-426E-40dd-AFC4-6F175D3DCCD1}">
-              <a14:hiddenFill xmlns:a14="http://schemas.microsoft.com/office/drawing/2010/main" xmlns="">
+              <a14:hiddenFill xmlns="" xmlns:a14="http://schemas.microsoft.com/office/drawing/2010/main">
                 <a:solidFill>
                   <a:srgbClr val="FFFFFF"/>
                 </a:solidFill>
@@ -7580,7 +7579,7 @@
           <a:p>
             <a:fld id="{6F3FE410-33A2-CB47-8127-299FF22D1A22}" type="datetime1">
               <a:rPr lang="en-IN" smtClean="0"/>
-              <a:t>27/06/19</a:t>
+              <a:t>28/06/19</a:t>
             </a:fld>
             <a:endParaRPr lang="en-IN"/>
           </a:p>
@@ -11151,7 +11150,7 @@
           <a:p>
             <a:fld id="{500D484D-755B-CC43-99C4-2BB0EB76FEF6}" type="datetime1">
               <a:rPr lang="en-IN" smtClean="0"/>
-              <a:t>27/06/19</a:t>
+              <a:t>28/06/19</a:t>
             </a:fld>
             <a:endParaRPr lang="en-IN"/>
           </a:p>
@@ -11854,7 +11853,7 @@
           <a:p>
             <a:fld id="{3825AC8A-E3E4-AB4D-AABE-2AF883CEDDEB}" type="datetime1">
               <a:rPr lang="en-IN" smtClean="0"/>
-              <a:t>27/06/19</a:t>
+              <a:t>28/06/19</a:t>
             </a:fld>
             <a:endParaRPr/>
           </a:p>
@@ -12323,7 +12322,7 @@
           <a:p>
             <a:fld id="{7DD0C667-8BB3-D74C-86FC-7D0CD1167351}" type="datetime1">
               <a:rPr lang="en-IN" smtClean="0"/>
-              <a:t>27/06/19</a:t>
+              <a:t>28/06/19</a:t>
             </a:fld>
             <a:endParaRPr lang="en-IN" dirty="0"/>
           </a:p>
@@ -12625,7 +12624,7 @@
           <a:p>
             <a:fld id="{54E004E4-6425-1046-B03F-6799B0FFAEB1}" type="datetime1">
               <a:rPr lang="en-IN" smtClean="0"/>
-              <a:t>27/06/19</a:t>
+              <a:t>28/06/19</a:t>
             </a:fld>
             <a:endParaRPr lang="en-IN"/>
           </a:p>
@@ -14063,7 +14062,7 @@
           <a:p>
             <a:fld id="{94A31C2B-8F11-8248-906D-0BD56E359BFE}" type="datetime1">
               <a:rPr lang="en-IN" smtClean="0"/>
-              <a:t>27/06/19</a:t>
+              <a:t>28/06/19</a:t>
             </a:fld>
             <a:endParaRPr lang="en-IN" dirty="0"/>
           </a:p>
@@ -15202,7 +15201,7 @@
           <a:p>
             <a:fld id="{A3A67E1C-BAD1-994B-B7B0-0862E7408890}" type="datetime1">
               <a:rPr lang="en-IN" smtClean="0"/>
-              <a:t>27/06/19</a:t>
+              <a:t>28/06/19</a:t>
             </a:fld>
             <a:endParaRPr lang="en-IN" dirty="0"/>
           </a:p>
@@ -16162,7 +16161,7 @@
           <a:p>
             <a:fld id="{AAC8EB75-20B8-FA41-8A25-CB9D4F4E068B}" type="datetime1">
               <a:rPr lang="en-IN" smtClean="0"/>
-              <a:t>27/06/19</a:t>
+              <a:t>28/06/19</a:t>
             </a:fld>
             <a:endParaRPr lang="en-IN" dirty="0"/>
           </a:p>
@@ -16671,7 +16670,7 @@
           <a:p>
             <a:fld id="{4EB8ED25-022A-B848-9E47-2A9D6C0BE6AE}" type="datetime1">
               <a:rPr lang="en-IN" smtClean="0"/>
-              <a:t>27/06/19</a:t>
+              <a:t>28/06/19</a:t>
             </a:fld>
             <a:endParaRPr lang="en-IN" dirty="0"/>
           </a:p>
@@ -17595,7 +17594,7 @@
           <a:p>
             <a:fld id="{371B733E-A046-7440-A009-9222C7A6AB80}" type="datetime1">
               <a:rPr lang="en-IN" smtClean="0"/>
-              <a:t>27/06/19</a:t>
+              <a:t>28/06/19</a:t>
             </a:fld>
             <a:endParaRPr lang="en-IN" dirty="0"/>
           </a:p>
@@ -18810,7 +18809,7 @@
           <a:p>
             <a:fld id="{EB6B529C-358E-464A-80D3-B4DD91120955}" type="datetime1">
               <a:rPr lang="en-IN" smtClean="0"/>
-              <a:t>27/06/19</a:t>
+              <a:t>28/06/19</a:t>
             </a:fld>
             <a:endParaRPr lang="en-IN" dirty="0"/>
           </a:p>
@@ -19620,7 +19619,7 @@
           <a:p>
             <a:fld id="{6E6F5B52-1A05-484E-BE74-C10EC951FF81}" type="datetime1">
               <a:rPr lang="en-IN" smtClean="0"/>
-              <a:t>27/06/19</a:t>
+              <a:t>28/06/19</a:t>
             </a:fld>
             <a:endParaRPr lang="en-IN" dirty="0"/>
           </a:p>
@@ -20376,7 +20375,7 @@
           <a:p>
             <a:fld id="{330D92EB-81BB-3B43-94C7-8FE4C43F772A}" type="datetime1">
               <a:rPr lang="en-IN" smtClean="0"/>
-              <a:t>27/06/19</a:t>
+              <a:t>28/06/19</a:t>
             </a:fld>
             <a:endParaRPr lang="en-IN" dirty="0"/>
           </a:p>
@@ -20438,10 +20437,10 @@
       </p:grpSpPr>
       <p:sp>
         <p:nvSpPr>
-          <p:cNvPr id="3" name="Content Placeholder 2">
-            <a:extLst>
-              <a:ext uri="{FF2B5EF4-FFF2-40B4-BE49-F238E27FC236}">
-                <a16:creationId xmlns:a16="http://schemas.microsoft.com/office/drawing/2014/main" id="{B3B1AE08-FBCF-B647-B458-87F3824A5471}"/>
+          <p:cNvPr id="4" name="Date Placeholder 3">
+            <a:extLst>
+              <a:ext uri="{FF2B5EF4-FFF2-40B4-BE49-F238E27FC236}">
+                <a16:creationId xmlns:a16="http://schemas.microsoft.com/office/drawing/2014/main" id="{91EDB48E-E193-C942-AD33-7E9E16BAE519}"/>
               </a:ext>
             </a:extLst>
           </p:cNvPr>
@@ -20449,58 +20448,17 @@
             <a:spLocks noGrp="1"/>
           </p:cNvSpPr>
           <p:nvPr>
-            <p:ph idx="15"/>
-          </p:nvPr>
-        </p:nvSpPr>
-        <p:spPr>
-          <a:xfrm>
-            <a:off x="185888" y="795639"/>
-            <a:ext cx="8515350" cy="609649"/>
-          </a:xfrm>
-        </p:spPr>
+            <p:ph type="dt" sz="half" idx="16"/>
+          </p:nvPr>
+        </p:nvSpPr>
+        <p:spPr/>
         <p:txBody>
           <a:bodyPr/>
           <a:lstStyle/>
           <a:p>
-            <a:r>
-              <a:rPr lang="en-US" dirty="0"/>
-              <a:t>Let's build a basic notification using the </a:t>
-            </a:r>
-            <a:r>
-              <a:rPr lang="en-US" dirty="0" err="1"/>
-              <a:t>NotificationCompat.Builder</a:t>
-            </a:r>
-            <a:r>
-              <a:rPr lang="en-US" dirty="0"/>
-              <a:t>. Typically this will contain at least an icon, a title, body</a:t>
-            </a:r>
-          </a:p>
-        </p:txBody>
-      </p:sp>
-      <p:sp>
-        <p:nvSpPr>
-          <p:cNvPr id="4" name="Date Placeholder 3">
-            <a:extLst>
-              <a:ext uri="{FF2B5EF4-FFF2-40B4-BE49-F238E27FC236}">
-                <a16:creationId xmlns:a16="http://schemas.microsoft.com/office/drawing/2014/main" id="{796A38AF-6FFF-7346-81AE-F73095486018}"/>
-              </a:ext>
-            </a:extLst>
-          </p:cNvPr>
-          <p:cNvSpPr>
-            <a:spLocks noGrp="1"/>
-          </p:cNvSpPr>
-          <p:nvPr>
-            <p:ph type="dt" sz="half" idx="16"/>
-          </p:nvPr>
-        </p:nvSpPr>
-        <p:spPr/>
-        <p:txBody>
-          <a:bodyPr/>
-          <a:lstStyle/>
-          <a:p>
             <a:fld id="{AAC8EB75-20B8-FA41-8A25-CB9D4F4E068B}" type="datetime1">
               <a:rPr lang="en-IN" smtClean="0"/>
-              <a:t>27/06/19</a:t>
+              <a:t>28/06/19</a:t>
             </a:fld>
             <a:endParaRPr lang="en-IN" dirty="0"/>
           </a:p>
@@ -20511,7 +20469,7 @@
           <p:cNvPr id="5" name="Slide Number Placeholder 4">
             <a:extLst>
               <a:ext uri="{FF2B5EF4-FFF2-40B4-BE49-F238E27FC236}">
-                <a16:creationId xmlns:a16="http://schemas.microsoft.com/office/drawing/2014/main" id="{6B1C5EE6-01C1-584E-97D1-9CF4EEDC4985}"/>
+                <a16:creationId xmlns:a16="http://schemas.microsoft.com/office/drawing/2014/main" id="{68BD48E2-C688-2D4C-ABE7-671A1C0F53CC}"/>
               </a:ext>
             </a:extLst>
           </p:cNvPr>
@@ -20540,7 +20498,7 @@
           <p:cNvPr id="6" name="Title 5">
             <a:extLst>
               <a:ext uri="{FF2B5EF4-FFF2-40B4-BE49-F238E27FC236}">
-                <a16:creationId xmlns:a16="http://schemas.microsoft.com/office/drawing/2014/main" id="{40523DA6-7DD4-154D-9759-96574BBBCE3D}"/>
+                <a16:creationId xmlns:a16="http://schemas.microsoft.com/office/drawing/2014/main" id="{1D4BC862-62B7-E946-9313-F10ADE86C68C}"/>
               </a:ext>
             </a:extLst>
           </p:cNvPr>
@@ -20551,14 +20509,19 @@
             <p:ph type="title"/>
           </p:nvPr>
         </p:nvSpPr>
-        <p:spPr/>
+        <p:spPr>
+          <a:xfrm>
+            <a:off x="316679" y="121966"/>
+            <a:ext cx="5708736" cy="382564"/>
+          </a:xfrm>
+        </p:spPr>
         <p:txBody>
           <a:bodyPr/>
           <a:lstStyle/>
           <a:p>
             <a:r>
               <a:rPr lang="en-US" dirty="0"/>
-              <a:t>Creating a Notification</a:t>
+              <a:t>Generic Method for Calling a notification</a:t>
             </a:r>
           </a:p>
         </p:txBody>
@@ -20568,7 +20531,7 @@
           <p:cNvPr id="7" name="Picture 6">
             <a:extLst>
               <a:ext uri="{FF2B5EF4-FFF2-40B4-BE49-F238E27FC236}">
-                <a16:creationId xmlns:a16="http://schemas.microsoft.com/office/drawing/2014/main" id="{A6E4B666-0CF3-BE49-8974-FBE3EA098238}"/>
+                <a16:creationId xmlns:a16="http://schemas.microsoft.com/office/drawing/2014/main" id="{DABD12C6-EA7C-8B46-8AEE-054A463C7E65}"/>
               </a:ext>
             </a:extLst>
           </p:cNvPr>
@@ -20585,38 +20548,8 @@
         </p:blipFill>
         <p:spPr>
           <a:xfrm>
-            <a:off x="0" y="1405288"/>
-            <a:ext cx="9144000" cy="1604019"/>
-          </a:xfrm>
-          <a:prstGeom prst="rect">
-            <a:avLst/>
-          </a:prstGeom>
-        </p:spPr>
-      </p:pic>
-      <p:pic>
-        <p:nvPicPr>
-          <p:cNvPr id="8" name="Picture 7">
-            <a:extLst>
-              <a:ext uri="{FF2B5EF4-FFF2-40B4-BE49-F238E27FC236}">
-                <a16:creationId xmlns:a16="http://schemas.microsoft.com/office/drawing/2014/main" id="{C5F4A733-0E43-5740-803C-F832C72BDCA8}"/>
-              </a:ext>
-            </a:extLst>
-          </p:cNvPr>
-          <p:cNvPicPr>
-            <a:picLocks noChangeAspect="1"/>
-          </p:cNvPicPr>
-          <p:nvPr/>
-        </p:nvPicPr>
-        <p:blipFill>
-          <a:blip r:embed="rId3"/>
-          <a:stretch>
-            <a:fillRect/>
-          </a:stretch>
-        </p:blipFill>
-        <p:spPr>
-          <a:xfrm>
-            <a:off x="134927" y="3163244"/>
-            <a:ext cx="8874146" cy="1253838"/>
+            <a:off x="0" y="1223693"/>
+            <a:ext cx="9144000" cy="2965622"/>
           </a:xfrm>
           <a:prstGeom prst="rect">
             <a:avLst/>
@@ -20626,7 +20559,7 @@
     </p:spTree>
     <p:extLst>
       <p:ext uri="{BB962C8B-B14F-4D97-AF65-F5344CB8AC3E}">
-        <p14:creationId xmlns:p14="http://schemas.microsoft.com/office/powerpoint/2010/main" val="3317379596"/>
+        <p14:creationId xmlns:p14="http://schemas.microsoft.com/office/powerpoint/2010/main" val="3963016664"/>
       </p:ext>
     </p:extLst>
   </p:cSld>
@@ -20655,10 +20588,10 @@
       </p:grpSpPr>
       <p:sp>
         <p:nvSpPr>
-          <p:cNvPr id="4" name="Date Placeholder 3">
-            <a:extLst>
-              <a:ext uri="{FF2B5EF4-FFF2-40B4-BE49-F238E27FC236}">
-                <a16:creationId xmlns:a16="http://schemas.microsoft.com/office/drawing/2014/main" id="{91EDB48E-E193-C942-AD33-7E9E16BAE519}"/>
+          <p:cNvPr id="3" name="Content Placeholder 2">
+            <a:extLst>
+              <a:ext uri="{FF2B5EF4-FFF2-40B4-BE49-F238E27FC236}">
+                <a16:creationId xmlns:a16="http://schemas.microsoft.com/office/drawing/2014/main" id="{A90D567B-D5B6-6349-BEEA-FF1A3720D2E8}"/>
               </a:ext>
             </a:extLst>
           </p:cNvPr>
@@ -20666,17 +20599,50 @@
             <a:spLocks noGrp="1"/>
           </p:cNvSpPr>
           <p:nvPr>
-            <p:ph type="dt" sz="half" idx="16"/>
-          </p:nvPr>
-        </p:nvSpPr>
-        <p:spPr/>
+            <p:ph idx="15"/>
+          </p:nvPr>
+        </p:nvSpPr>
+        <p:spPr>
+          <a:xfrm>
+            <a:off x="628650" y="930392"/>
+            <a:ext cx="7886700" cy="2380699"/>
+          </a:xfrm>
+        </p:spPr>
         <p:txBody>
           <a:bodyPr/>
           <a:lstStyle/>
           <a:p>
+            <a:r>
+              <a:rPr lang="en-US" dirty="0"/>
+              <a:t>Android service is a component that is used to perform operations on the background such as playing music, handle network transactions, interacting content providers etc. It doesn't has any UI (user interface).</a:t>
+            </a:r>
+          </a:p>
+        </p:txBody>
+      </p:sp>
+      <p:sp>
+        <p:nvSpPr>
+          <p:cNvPr id="4" name="Date Placeholder 3">
+            <a:extLst>
+              <a:ext uri="{FF2B5EF4-FFF2-40B4-BE49-F238E27FC236}">
+                <a16:creationId xmlns:a16="http://schemas.microsoft.com/office/drawing/2014/main" id="{C6699D5F-C7BE-274F-B576-8C1BBF4D3EC1}"/>
+              </a:ext>
+            </a:extLst>
+          </p:cNvPr>
+          <p:cNvSpPr>
+            <a:spLocks noGrp="1"/>
+          </p:cNvSpPr>
+          <p:nvPr>
+            <p:ph type="dt" sz="half" idx="16"/>
+          </p:nvPr>
+        </p:nvSpPr>
+        <p:spPr/>
+        <p:txBody>
+          <a:bodyPr/>
+          <a:lstStyle/>
+          <a:p>
             <a:fld id="{AAC8EB75-20B8-FA41-8A25-CB9D4F4E068B}" type="datetime1">
               <a:rPr lang="en-IN" smtClean="0"/>
-              <a:t>27/06/19</a:t>
+              <a:t>28/06/19</a:t>
             </a:fld>
             <a:endParaRPr lang="en-IN" dirty="0"/>
           </a:p>
@@ -20687,7 +20653,7 @@
           <p:cNvPr id="5" name="Slide Number Placeholder 4">
             <a:extLst>
               <a:ext uri="{FF2B5EF4-FFF2-40B4-BE49-F238E27FC236}">
-                <a16:creationId xmlns:a16="http://schemas.microsoft.com/office/drawing/2014/main" id="{68BD48E2-C688-2D4C-ABE7-671A1C0F53CC}"/>
+                <a16:creationId xmlns:a16="http://schemas.microsoft.com/office/drawing/2014/main" id="{DCC4AABA-B569-E44B-8FE2-48516FD2114D}"/>
               </a:ext>
             </a:extLst>
           </p:cNvPr>
@@ -20716,7 +20682,7 @@
           <p:cNvPr id="6" name="Title 5">
             <a:extLst>
               <a:ext uri="{FF2B5EF4-FFF2-40B4-BE49-F238E27FC236}">
-                <a16:creationId xmlns:a16="http://schemas.microsoft.com/office/drawing/2014/main" id="{1D4BC862-62B7-E946-9313-F10ADE86C68C}"/>
+                <a16:creationId xmlns:a16="http://schemas.microsoft.com/office/drawing/2014/main" id="{2CD71ED1-02AC-044C-970E-B0C6AE28AE1C}"/>
               </a:ext>
             </a:extLst>
           </p:cNvPr>
@@ -20727,19 +20693,14 @@
             <p:ph type="title"/>
           </p:nvPr>
         </p:nvSpPr>
-        <p:spPr>
-          <a:xfrm>
-            <a:off x="316679" y="121966"/>
-            <a:ext cx="5708736" cy="382564"/>
-          </a:xfrm>
-        </p:spPr>
+        <p:spPr/>
         <p:txBody>
           <a:bodyPr/>
           <a:lstStyle/>
           <a:p>
             <a:r>
               <a:rPr lang="en-US" dirty="0"/>
-              <a:t>Generic Method for Calling a notification</a:t>
+              <a:t>Service</a:t>
             </a:r>
           </a:p>
         </p:txBody>
@@ -20749,7 +20710,7 @@
           <p:cNvPr id="7" name="Picture 6">
             <a:extLst>
               <a:ext uri="{FF2B5EF4-FFF2-40B4-BE49-F238E27FC236}">
-                <a16:creationId xmlns:a16="http://schemas.microsoft.com/office/drawing/2014/main" id="{DABD12C6-EA7C-8B46-8AEE-054A463C7E65}"/>
+                <a16:creationId xmlns:a16="http://schemas.microsoft.com/office/drawing/2014/main" id="{B116FE17-FCB6-DF44-B6D8-8A4966818C6F}"/>
               </a:ext>
             </a:extLst>
           </p:cNvPr>
@@ -20766,8 +20727,8 @@
         </p:blipFill>
         <p:spPr>
           <a:xfrm>
-            <a:off x="0" y="1223693"/>
-            <a:ext cx="9144000" cy="2965622"/>
+            <a:off x="2918174" y="1870310"/>
+            <a:ext cx="2268816" cy="2881562"/>
           </a:xfrm>
           <a:prstGeom prst="rect">
             <a:avLst/>
@@ -20777,7 +20738,7 @@
     </p:spTree>
     <p:extLst>
       <p:ext uri="{BB962C8B-B14F-4D97-AF65-F5344CB8AC3E}">
-        <p14:creationId xmlns:p14="http://schemas.microsoft.com/office/powerpoint/2010/main" val="3963016664"/>
+        <p14:creationId xmlns:p14="http://schemas.microsoft.com/office/powerpoint/2010/main" val="1294143374"/>
       </p:ext>
     </p:extLst>
   </p:cSld>
@@ -20806,10 +20767,10 @@
       </p:grpSpPr>
       <p:sp>
         <p:nvSpPr>
-          <p:cNvPr id="3" name="Content Placeholder 2">
-            <a:extLst>
-              <a:ext uri="{FF2B5EF4-FFF2-40B4-BE49-F238E27FC236}">
-                <a16:creationId xmlns:a16="http://schemas.microsoft.com/office/drawing/2014/main" id="{A90D567B-D5B6-6349-BEEA-FF1A3720D2E8}"/>
+          <p:cNvPr id="7" name="Title 6">
+            <a:extLst>
+              <a:ext uri="{FF2B5EF4-FFF2-40B4-BE49-F238E27FC236}">
+                <a16:creationId xmlns:a16="http://schemas.microsoft.com/office/drawing/2014/main" id="{106A37A9-57E5-744E-9606-B56B8D2CC94D}"/>
               </a:ext>
             </a:extLst>
           </p:cNvPr>
@@ -20817,13 +20778,13 @@
             <a:spLocks noGrp="1"/>
           </p:cNvSpPr>
           <p:nvPr>
-            <p:ph idx="15"/>
-          </p:nvPr>
-        </p:nvSpPr>
-        <p:spPr>
-          <a:xfrm>
-            <a:off x="628650" y="930392"/>
-            <a:ext cx="7886700" cy="2380699"/>
+            <p:ph type="title"/>
+          </p:nvPr>
+        </p:nvSpPr>
+        <p:spPr>
+          <a:xfrm>
+            <a:off x="2892175" y="2290546"/>
+            <a:ext cx="3075488" cy="562407"/>
           </a:xfrm>
         </p:spPr>
         <p:txBody>
@@ -20832,7 +20793,7 @@
           <a:p>
             <a:r>
               <a:rPr lang="en-US" dirty="0"/>
-              <a:t>Android service is a component that is used to perform operations on the background such as playing music, handle network transactions, interacting content providers etc. It doesn't has any UI (user interface).</a:t>
+              <a:t>Demo Service</a:t>
             </a:r>
           </a:p>
         </p:txBody>
@@ -20842,7 +20803,7 @@
           <p:cNvPr id="4" name="Date Placeholder 3">
             <a:extLst>
               <a:ext uri="{FF2B5EF4-FFF2-40B4-BE49-F238E27FC236}">
-                <a16:creationId xmlns:a16="http://schemas.microsoft.com/office/drawing/2014/main" id="{C6699D5F-C7BE-274F-B576-8C1BBF4D3EC1}"/>
+                <a16:creationId xmlns:a16="http://schemas.microsoft.com/office/drawing/2014/main" id="{CEC6DFF6-BC0C-5245-A571-2FD90FDF9646}"/>
               </a:ext>
             </a:extLst>
           </p:cNvPr>
@@ -20850,7 +20811,7 @@
             <a:spLocks noGrp="1"/>
           </p:cNvSpPr>
           <p:nvPr>
-            <p:ph type="dt" sz="half" idx="16"/>
+            <p:ph type="dt" sz="half" idx="10"/>
           </p:nvPr>
         </p:nvSpPr>
         <p:spPr/>
@@ -20860,7 +20821,7 @@
           <a:p>
             <a:fld id="{AAC8EB75-20B8-FA41-8A25-CB9D4F4E068B}" type="datetime1">
               <a:rPr lang="en-IN" smtClean="0"/>
-              <a:t>27/06/19</a:t>
+              <a:t>28/06/19</a:t>
             </a:fld>
             <a:endParaRPr lang="en-IN" dirty="0"/>
           </a:p>
@@ -20871,7 +20832,7 @@
           <p:cNvPr id="5" name="Slide Number Placeholder 4">
             <a:extLst>
               <a:ext uri="{FF2B5EF4-FFF2-40B4-BE49-F238E27FC236}">
-                <a16:creationId xmlns:a16="http://schemas.microsoft.com/office/drawing/2014/main" id="{DCC4AABA-B569-E44B-8FE2-48516FD2114D}"/>
+                <a16:creationId xmlns:a16="http://schemas.microsoft.com/office/drawing/2014/main" id="{A49DAD10-EAB3-E241-9413-99E41761D334}"/>
               </a:ext>
             </a:extLst>
           </p:cNvPr>
@@ -20895,68 +20856,10 @@
           </a:p>
         </p:txBody>
       </p:sp>
-      <p:sp>
-        <p:nvSpPr>
-          <p:cNvPr id="6" name="Title 5">
-            <a:extLst>
-              <a:ext uri="{FF2B5EF4-FFF2-40B4-BE49-F238E27FC236}">
-                <a16:creationId xmlns:a16="http://schemas.microsoft.com/office/drawing/2014/main" id="{2CD71ED1-02AC-044C-970E-B0C6AE28AE1C}"/>
-              </a:ext>
-            </a:extLst>
-          </p:cNvPr>
-          <p:cNvSpPr>
-            <a:spLocks noGrp="1"/>
-          </p:cNvSpPr>
-          <p:nvPr>
-            <p:ph type="title"/>
-          </p:nvPr>
-        </p:nvSpPr>
-        <p:spPr/>
-        <p:txBody>
-          <a:bodyPr/>
-          <a:lstStyle/>
-          <a:p>
-            <a:r>
-              <a:rPr lang="en-US" dirty="0"/>
-              <a:t>Service</a:t>
-            </a:r>
-          </a:p>
-        </p:txBody>
-      </p:sp>
-      <p:pic>
-        <p:nvPicPr>
-          <p:cNvPr id="7" name="Picture 6">
-            <a:extLst>
-              <a:ext uri="{FF2B5EF4-FFF2-40B4-BE49-F238E27FC236}">
-                <a16:creationId xmlns:a16="http://schemas.microsoft.com/office/drawing/2014/main" id="{B116FE17-FCB6-DF44-B6D8-8A4966818C6F}"/>
-              </a:ext>
-            </a:extLst>
-          </p:cNvPr>
-          <p:cNvPicPr>
-            <a:picLocks noChangeAspect="1"/>
-          </p:cNvPicPr>
-          <p:nvPr/>
-        </p:nvPicPr>
-        <p:blipFill>
-          <a:blip r:embed="rId2"/>
-          <a:stretch>
-            <a:fillRect/>
-          </a:stretch>
-        </p:blipFill>
-        <p:spPr>
-          <a:xfrm>
-            <a:off x="2918174" y="1870310"/>
-            <a:ext cx="2268816" cy="2881562"/>
-          </a:xfrm>
-          <a:prstGeom prst="rect">
-            <a:avLst/>
-          </a:prstGeom>
-        </p:spPr>
-      </p:pic>
     </p:spTree>
     <p:extLst>
       <p:ext uri="{BB962C8B-B14F-4D97-AF65-F5344CB8AC3E}">
-        <p14:creationId xmlns:p14="http://schemas.microsoft.com/office/powerpoint/2010/main" val="1294143374"/>
+        <p14:creationId xmlns:p14="http://schemas.microsoft.com/office/powerpoint/2010/main" val="3893835078"/>
       </p:ext>
     </p:extLst>
   </p:cSld>
@@ -20985,10 +20888,10 @@
       </p:grpSpPr>
       <p:sp>
         <p:nvSpPr>
-          <p:cNvPr id="7" name="Title 6">
-            <a:extLst>
-              <a:ext uri="{FF2B5EF4-FFF2-40B4-BE49-F238E27FC236}">
-                <a16:creationId xmlns:a16="http://schemas.microsoft.com/office/drawing/2014/main" id="{106A37A9-57E5-744E-9606-B56B8D2CC94D}"/>
+          <p:cNvPr id="3" name="Content Placeholder 2">
+            <a:extLst>
+              <a:ext uri="{FF2B5EF4-FFF2-40B4-BE49-F238E27FC236}">
+                <a16:creationId xmlns:a16="http://schemas.microsoft.com/office/drawing/2014/main" id="{0E19B3A8-8A91-AC47-85AD-07753853C20F}"/>
               </a:ext>
             </a:extLst>
           </p:cNvPr>
@@ -20996,13 +20899,13 @@
             <a:spLocks noGrp="1"/>
           </p:cNvSpPr>
           <p:nvPr>
-            <p:ph type="title"/>
-          </p:nvPr>
-        </p:nvSpPr>
-        <p:spPr>
-          <a:xfrm>
-            <a:off x="2892175" y="2290546"/>
-            <a:ext cx="3075488" cy="562407"/>
+            <p:ph idx="15"/>
+          </p:nvPr>
+        </p:nvSpPr>
+        <p:spPr>
+          <a:xfrm>
+            <a:off x="628650" y="1159013"/>
+            <a:ext cx="7543198" cy="1949948"/>
           </a:xfrm>
         </p:spPr>
         <p:txBody>
@@ -21011,7 +20914,7 @@
           <a:p>
             <a:r>
               <a:rPr lang="en-US" dirty="0"/>
-              <a:t>Demo Service</a:t>
+              <a:t>Broadcast Receivers simply respond to broadcast messages from other applications or from the system itself. These messages are sometime called events or intents. For example, applications can also initiate broadcasts to let other applications know that some data has been downloaded to the device and is available for them to use, so this is broadcast receiver who will intercept this communication and will initiate appropriate action.</a:t>
             </a:r>
           </a:p>
         </p:txBody>
@@ -21021,7 +20924,7 @@
           <p:cNvPr id="4" name="Date Placeholder 3">
             <a:extLst>
               <a:ext uri="{FF2B5EF4-FFF2-40B4-BE49-F238E27FC236}">
-                <a16:creationId xmlns:a16="http://schemas.microsoft.com/office/drawing/2014/main" id="{CEC6DFF6-BC0C-5245-A571-2FD90FDF9646}"/>
+                <a16:creationId xmlns:a16="http://schemas.microsoft.com/office/drawing/2014/main" id="{DF1E0C13-8B71-D543-A679-C307F1FB01EE}"/>
               </a:ext>
             </a:extLst>
           </p:cNvPr>
@@ -21029,7 +20932,7 @@
             <a:spLocks noGrp="1"/>
           </p:cNvSpPr>
           <p:nvPr>
-            <p:ph type="dt" sz="half" idx="10"/>
+            <p:ph type="dt" sz="half" idx="16"/>
           </p:nvPr>
         </p:nvSpPr>
         <p:spPr/>
@@ -21039,7 +20942,7 @@
           <a:p>
             <a:fld id="{AAC8EB75-20B8-FA41-8A25-CB9D4F4E068B}" type="datetime1">
               <a:rPr lang="en-IN" smtClean="0"/>
-              <a:t>27/06/19</a:t>
+              <a:t>28/06/19</a:t>
             </a:fld>
             <a:endParaRPr lang="en-IN" dirty="0"/>
           </a:p>
@@ -21050,7 +20953,7 @@
           <p:cNvPr id="5" name="Slide Number Placeholder 4">
             <a:extLst>
               <a:ext uri="{FF2B5EF4-FFF2-40B4-BE49-F238E27FC236}">
-                <a16:creationId xmlns:a16="http://schemas.microsoft.com/office/drawing/2014/main" id="{A49DAD10-EAB3-E241-9413-99E41761D334}"/>
+                <a16:creationId xmlns:a16="http://schemas.microsoft.com/office/drawing/2014/main" id="{3EEE84A8-FAB6-A440-8646-6584B204A516}"/>
               </a:ext>
             </a:extLst>
           </p:cNvPr>
@@ -21074,10 +20977,38 @@
           </a:p>
         </p:txBody>
       </p:sp>
+      <p:sp>
+        <p:nvSpPr>
+          <p:cNvPr id="6" name="Title 5">
+            <a:extLst>
+              <a:ext uri="{FF2B5EF4-FFF2-40B4-BE49-F238E27FC236}">
+                <a16:creationId xmlns:a16="http://schemas.microsoft.com/office/drawing/2014/main" id="{CE1209E5-437F-4849-8C3D-3B0F9985F674}"/>
+              </a:ext>
+            </a:extLst>
+          </p:cNvPr>
+          <p:cNvSpPr>
+            <a:spLocks noGrp="1"/>
+          </p:cNvSpPr>
+          <p:nvPr>
+            <p:ph type="title"/>
+          </p:nvPr>
+        </p:nvSpPr>
+        <p:spPr/>
+        <p:txBody>
+          <a:bodyPr/>
+          <a:lstStyle/>
+          <a:p>
+            <a:r>
+              <a:rPr lang="en-US" dirty="0"/>
+              <a:t>Broadcast Receiver</a:t>
+            </a:r>
+          </a:p>
+        </p:txBody>
+      </p:sp>
     </p:spTree>
     <p:extLst>
       <p:ext uri="{BB962C8B-B14F-4D97-AF65-F5344CB8AC3E}">
-        <p14:creationId xmlns:p14="http://schemas.microsoft.com/office/powerpoint/2010/main" val="3893835078"/>
+        <p14:creationId xmlns:p14="http://schemas.microsoft.com/office/powerpoint/2010/main" val="3730608469"/>
       </p:ext>
     </p:extLst>
   </p:cSld>
@@ -21106,155 +21037,6 @@
       </p:grpSpPr>
       <p:sp>
         <p:nvSpPr>
-          <p:cNvPr id="3" name="Content Placeholder 2">
-            <a:extLst>
-              <a:ext uri="{FF2B5EF4-FFF2-40B4-BE49-F238E27FC236}">
-                <a16:creationId xmlns:a16="http://schemas.microsoft.com/office/drawing/2014/main" id="{0E19B3A8-8A91-AC47-85AD-07753853C20F}"/>
-              </a:ext>
-            </a:extLst>
-          </p:cNvPr>
-          <p:cNvSpPr>
-            <a:spLocks noGrp="1"/>
-          </p:cNvSpPr>
-          <p:nvPr>
-            <p:ph idx="15"/>
-          </p:nvPr>
-        </p:nvSpPr>
-        <p:spPr>
-          <a:xfrm>
-            <a:off x="628650" y="1159013"/>
-            <a:ext cx="7543198" cy="1949948"/>
-          </a:xfrm>
-        </p:spPr>
-        <p:txBody>
-          <a:bodyPr/>
-          <a:lstStyle/>
-          <a:p>
-            <a:r>
-              <a:rPr lang="en-US" dirty="0"/>
-              <a:t>Broadcast Receivers simply respond to broadcast messages from other applications or from the system itself. These messages are sometime called events or intents. For example, applications can also initiate broadcasts to let other applications know that some data has been downloaded to the device and is available for them to use, so this is broadcast receiver who will intercept this communication and will initiate appropriate action.</a:t>
-            </a:r>
-          </a:p>
-        </p:txBody>
-      </p:sp>
-      <p:sp>
-        <p:nvSpPr>
-          <p:cNvPr id="4" name="Date Placeholder 3">
-            <a:extLst>
-              <a:ext uri="{FF2B5EF4-FFF2-40B4-BE49-F238E27FC236}">
-                <a16:creationId xmlns:a16="http://schemas.microsoft.com/office/drawing/2014/main" id="{DF1E0C13-8B71-D543-A679-C307F1FB01EE}"/>
-              </a:ext>
-            </a:extLst>
-          </p:cNvPr>
-          <p:cNvSpPr>
-            <a:spLocks noGrp="1"/>
-          </p:cNvSpPr>
-          <p:nvPr>
-            <p:ph type="dt" sz="half" idx="16"/>
-          </p:nvPr>
-        </p:nvSpPr>
-        <p:spPr/>
-        <p:txBody>
-          <a:bodyPr/>
-          <a:lstStyle/>
-          <a:p>
-            <a:fld id="{AAC8EB75-20B8-FA41-8A25-CB9D4F4E068B}" type="datetime1">
-              <a:rPr lang="en-IN" smtClean="0"/>
-              <a:t>27/06/19</a:t>
-            </a:fld>
-            <a:endParaRPr lang="en-IN" dirty="0"/>
-          </a:p>
-        </p:txBody>
-      </p:sp>
-      <p:sp>
-        <p:nvSpPr>
-          <p:cNvPr id="5" name="Slide Number Placeholder 4">
-            <a:extLst>
-              <a:ext uri="{FF2B5EF4-FFF2-40B4-BE49-F238E27FC236}">
-                <a16:creationId xmlns:a16="http://schemas.microsoft.com/office/drawing/2014/main" id="{3EEE84A8-FAB6-A440-8646-6584B204A516}"/>
-              </a:ext>
-            </a:extLst>
-          </p:cNvPr>
-          <p:cNvSpPr>
-            <a:spLocks noGrp="1"/>
-          </p:cNvSpPr>
-          <p:nvPr>
-            <p:ph type="sldNum" sz="quarter" idx="12"/>
-          </p:nvPr>
-        </p:nvSpPr>
-        <p:spPr/>
-        <p:txBody>
-          <a:bodyPr/>
-          <a:lstStyle/>
-          <a:p>
-            <a:fld id="{273EEA2F-D825-49D3-9C25-497F06EFD3F7}" type="slidenum">
-              <a:rPr lang="en-IN" smtClean="0"/>
-              <a:t>14</a:t>
-            </a:fld>
-            <a:endParaRPr lang="en-IN" dirty="0"/>
-          </a:p>
-        </p:txBody>
-      </p:sp>
-      <p:sp>
-        <p:nvSpPr>
-          <p:cNvPr id="6" name="Title 5">
-            <a:extLst>
-              <a:ext uri="{FF2B5EF4-FFF2-40B4-BE49-F238E27FC236}">
-                <a16:creationId xmlns:a16="http://schemas.microsoft.com/office/drawing/2014/main" id="{CE1209E5-437F-4849-8C3D-3B0F9985F674}"/>
-              </a:ext>
-            </a:extLst>
-          </p:cNvPr>
-          <p:cNvSpPr>
-            <a:spLocks noGrp="1"/>
-          </p:cNvSpPr>
-          <p:nvPr>
-            <p:ph type="title"/>
-          </p:nvPr>
-        </p:nvSpPr>
-        <p:spPr/>
-        <p:txBody>
-          <a:bodyPr/>
-          <a:lstStyle/>
-          <a:p>
-            <a:r>
-              <a:rPr lang="en-US" dirty="0"/>
-              <a:t>Broadcast Receiver</a:t>
-            </a:r>
-          </a:p>
-        </p:txBody>
-      </p:sp>
-    </p:spTree>
-    <p:extLst>
-      <p:ext uri="{BB962C8B-B14F-4D97-AF65-F5344CB8AC3E}">
-        <p14:creationId xmlns:p14="http://schemas.microsoft.com/office/powerpoint/2010/main" val="3730608469"/>
-      </p:ext>
-    </p:extLst>
-  </p:cSld>
-  <p:clrMapOvr>
-    <a:masterClrMapping/>
-  </p:clrMapOvr>
-</p:sld>
-</file>
-
-<file path=ppt/slides/slide15.xml><?xml version="1.0" encoding="utf-8"?>
-<p:sld xmlns:a="http://schemas.openxmlformats.org/drawingml/2006/main" xmlns:r="http://schemas.openxmlformats.org/officeDocument/2006/relationships" xmlns:p="http://schemas.openxmlformats.org/presentationml/2006/main">
-  <p:cSld>
-    <p:spTree>
-      <p:nvGrpSpPr>
-        <p:cNvPr id="1" name=""/>
-        <p:cNvGrpSpPr/>
-        <p:nvPr/>
-      </p:nvGrpSpPr>
-      <p:grpSpPr>
-        <a:xfrm>
-          <a:off x="0" y="0"/>
-          <a:ext cx="0" cy="0"/>
-          <a:chOff x="0" y="0"/>
-          <a:chExt cx="0" cy="0"/>
-        </a:xfrm>
-      </p:grpSpPr>
-      <p:sp>
-        <p:nvSpPr>
           <p:cNvPr id="7" name="Title 6">
             <a:extLst>
               <a:ext uri="{FF2B5EF4-FFF2-40B4-BE49-F238E27FC236}">
@@ -21309,7 +21091,7 @@
           <a:p>
             <a:fld id="{AAC8EB75-20B8-FA41-8A25-CB9D4F4E068B}" type="datetime1">
               <a:rPr lang="en-IN" smtClean="0"/>
-              <a:t>27/06/19</a:t>
+              <a:t>28/06/19</a:t>
             </a:fld>
             <a:endParaRPr lang="en-IN" dirty="0"/>
           </a:p>
@@ -21338,7 +21120,7 @@
           <a:p>
             <a:fld id="{273EEA2F-D825-49D3-9C25-497F06EFD3F7}" type="slidenum">
               <a:rPr lang="en-IN" smtClean="0"/>
-              <a:t>15</a:t>
+              <a:t>14</a:t>
             </a:fld>
             <a:endParaRPr lang="en-IN" dirty="0"/>
           </a:p>
@@ -21357,7 +21139,7 @@
 </p:sld>
 </file>
 
-<file path=ppt/slides/slide16.xml><?xml version="1.0" encoding="utf-8"?>
+<file path=ppt/slides/slide15.xml><?xml version="1.0" encoding="utf-8"?>
 <p:sld xmlns:a="http://schemas.openxmlformats.org/drawingml/2006/main" xmlns:r="http://schemas.openxmlformats.org/officeDocument/2006/relationships" xmlns:p="http://schemas.openxmlformats.org/presentationml/2006/main">
   <p:cSld>
     <p:spTree>
@@ -21690,7 +21472,7 @@
           <a:p>
             <a:fld id="{05F9FE4C-6887-C742-8AA6-90375168B633}" type="datetime1">
               <a:rPr lang="en-IN" smtClean="0"/>
-              <a:t>27/06/19</a:t>
+              <a:t>28/06/19</a:t>
             </a:fld>
             <a:endParaRPr lang="en-IN" dirty="0"/>
           </a:p>
@@ -21714,7 +21496,7 @@
             <a:fld id="{273EEA2F-D825-49D3-9C25-497F06EFD3F7}" type="slidenum">
               <a:rPr lang="en-IN" smtClean="0"/>
               <a:pPr/>
-              <a:t>16</a:t>
+              <a:t>15</a:t>
             </a:fld>
             <a:endParaRPr lang="en-IN" dirty="0"/>
           </a:p>
@@ -21829,7 +21611,7 @@
                 <a:cs typeface="Proxima Nova"/>
                 <a:sym typeface="Proxima Nova"/>
               </a:rPr>
-              <a:t>27/06/19</a:t>
+              <a:t>28/06/19</a:t>
             </a:fld>
             <a:endParaRPr sz="900">
               <a:solidFill>
@@ -22055,7 +21837,7 @@
                 <a:cs typeface="Proxima Nova"/>
                 <a:sym typeface="Proxima Nova"/>
               </a:rPr>
-              <a:t> Menus &amp;  Material Design</a:t>
+              <a:t> Notification &amp; Services</a:t>
             </a:r>
           </a:p>
           <a:p>
@@ -22197,7 +21979,7 @@
               <a:rPr lang="en-IN" sz="900" smtClean="0">
                 <a:latin typeface="Proxima Nova Rg" pitchFamily="50" charset="0"/>
               </a:rPr>
-              <a:t>27/06/19</a:t>
+              <a:t>28/06/19</a:t>
             </a:fld>
             <a:endParaRPr lang="en-IN" sz="900" dirty="0">
               <a:latin typeface="Proxima Nova Rg" pitchFamily="50" charset="0"/>
@@ -22468,7 +22250,7 @@
               <a:rPr lang="en-IN" sz="900" smtClean="0">
                 <a:latin typeface="Proxima Nova Rg" pitchFamily="50" charset="0"/>
               </a:rPr>
-              <a:t>27/06/19</a:t>
+              <a:t>28/06/19</a:t>
             </a:fld>
             <a:endParaRPr lang="en-IN" sz="900" dirty="0">
               <a:latin typeface="Proxima Nova Rg" pitchFamily="50" charset="0"/>
@@ -22691,10 +22473,10 @@
       </p:grpSpPr>
       <p:sp>
         <p:nvSpPr>
-          <p:cNvPr id="5" name="Title 4">
-            <a:extLst>
-              <a:ext uri="{FF2B5EF4-FFF2-40B4-BE49-F238E27FC236}">
-                <a16:creationId xmlns:a16="http://schemas.microsoft.com/office/drawing/2014/main" id="{EAB489D5-0190-8B4A-911F-896FF3A9BC74}"/>
+          <p:cNvPr id="3" name="Date Placeholder 2">
+            <a:extLst>
+              <a:ext uri="{FF2B5EF4-FFF2-40B4-BE49-F238E27FC236}">
+                <a16:creationId xmlns:a16="http://schemas.microsoft.com/office/drawing/2014/main" id="{38EA1B8A-0341-8A42-874E-D4DE268E665D}"/>
               </a:ext>
             </a:extLst>
           </p:cNvPr>
@@ -22702,61 +22484,28 @@
             <a:spLocks noGrp="1"/>
           </p:cNvSpPr>
           <p:nvPr>
-            <p:ph type="title"/>
-          </p:nvPr>
-        </p:nvSpPr>
-        <p:spPr>
-          <a:xfrm>
-            <a:off x="1496082" y="2009343"/>
-            <a:ext cx="5990568" cy="562407"/>
-          </a:xfrm>
-        </p:spPr>
+            <p:ph type="dt" sz="half" idx="16"/>
+          </p:nvPr>
+        </p:nvSpPr>
+        <p:spPr/>
         <p:txBody>
           <a:bodyPr/>
           <a:lstStyle/>
           <a:p>
-            <a:r>
-              <a:rPr lang="en-US" dirty="0"/>
-              <a:t>Demo Navigation Drawer</a:t>
-            </a:r>
-          </a:p>
-        </p:txBody>
-      </p:sp>
-      <p:sp>
-        <p:nvSpPr>
-          <p:cNvPr id="2" name="Date Placeholder 1">
-            <a:extLst>
-              <a:ext uri="{FF2B5EF4-FFF2-40B4-BE49-F238E27FC236}">
-                <a16:creationId xmlns:a16="http://schemas.microsoft.com/office/drawing/2014/main" id="{97AC0D7D-5C58-ED45-8CAA-6B616A89BB07}"/>
-              </a:ext>
-            </a:extLst>
-          </p:cNvPr>
-          <p:cNvSpPr>
-            <a:spLocks noGrp="1"/>
-          </p:cNvSpPr>
-          <p:nvPr>
-            <p:ph type="dt" sz="half" idx="10"/>
-          </p:nvPr>
-        </p:nvSpPr>
-        <p:spPr/>
-        <p:txBody>
-          <a:bodyPr/>
-          <a:lstStyle/>
-          <a:p>
-            <a:fld id="{24A60580-2B70-6940-B3F0-E4F8AB7AA3B6}" type="datetime1">
+            <a:fld id="{7DD0C667-8BB3-D74C-86FC-7D0CD1167351}" type="datetime1">
               <a:rPr lang="en-IN" smtClean="0"/>
-              <a:t>27/06/19</a:t>
+              <a:t>28/06/19</a:t>
             </a:fld>
-            <a:endParaRPr lang="en-IN"/>
-          </a:p>
-        </p:txBody>
-      </p:sp>
-      <p:sp>
-        <p:nvSpPr>
-          <p:cNvPr id="3" name="Slide Number Placeholder 2">
-            <a:extLst>
-              <a:ext uri="{FF2B5EF4-FFF2-40B4-BE49-F238E27FC236}">
-                <a16:creationId xmlns:a16="http://schemas.microsoft.com/office/drawing/2014/main" id="{BC9F7507-BB7A-0742-AED8-67F1E1B97970}"/>
+            <a:endParaRPr lang="en-IN" dirty="0"/>
+          </a:p>
+        </p:txBody>
+      </p:sp>
+      <p:sp>
+        <p:nvSpPr>
+          <p:cNvPr id="5" name="Slide Number Placeholder 4">
+            <a:extLst>
+              <a:ext uri="{FF2B5EF4-FFF2-40B4-BE49-F238E27FC236}">
+                <a16:creationId xmlns:a16="http://schemas.microsoft.com/office/drawing/2014/main" id="{5E51FB69-4340-8F4D-90AA-90A140B31F98}"/>
               </a:ext>
             </a:extLst>
           </p:cNvPr>
@@ -22776,14 +22525,107 @@
               <a:rPr lang="en-IN" smtClean="0"/>
               <a:t>5</a:t>
             </a:fld>
-            <a:endParaRPr lang="en-IN"/>
-          </a:p>
-        </p:txBody>
-      </p:sp>
+            <a:endParaRPr lang="en-IN" dirty="0"/>
+          </a:p>
+        </p:txBody>
+      </p:sp>
+      <p:sp>
+        <p:nvSpPr>
+          <p:cNvPr id="8" name="Title 7">
+            <a:extLst>
+              <a:ext uri="{FF2B5EF4-FFF2-40B4-BE49-F238E27FC236}">
+                <a16:creationId xmlns:a16="http://schemas.microsoft.com/office/drawing/2014/main" id="{41720887-7F05-D040-986B-5A00E5BD1FC0}"/>
+              </a:ext>
+            </a:extLst>
+          </p:cNvPr>
+          <p:cNvSpPr>
+            <a:spLocks noGrp="1"/>
+          </p:cNvSpPr>
+          <p:nvPr>
+            <p:ph type="title"/>
+          </p:nvPr>
+        </p:nvSpPr>
+        <p:spPr/>
+        <p:txBody>
+          <a:bodyPr/>
+          <a:lstStyle/>
+          <a:p>
+            <a:r>
+              <a:rPr lang="en-US" dirty="0" err="1"/>
+              <a:t>ViewPager</a:t>
+            </a:r>
+            <a:endParaRPr lang="en-US" dirty="0"/>
+          </a:p>
+        </p:txBody>
+      </p:sp>
+      <p:sp>
+        <p:nvSpPr>
+          <p:cNvPr id="11" name="Rectangle 10">
+            <a:extLst>
+              <a:ext uri="{FF2B5EF4-FFF2-40B4-BE49-F238E27FC236}">
+                <a16:creationId xmlns:a16="http://schemas.microsoft.com/office/drawing/2014/main" id="{D59BB89E-D5CA-0442-8CA8-AA9A69CD0B81}"/>
+              </a:ext>
+            </a:extLst>
+          </p:cNvPr>
+          <p:cNvSpPr/>
+          <p:nvPr/>
+        </p:nvSpPr>
+        <p:spPr>
+          <a:xfrm>
+            <a:off x="316679" y="912807"/>
+            <a:ext cx="5885848" cy="923330"/>
+          </a:xfrm>
+          <a:prstGeom prst="rect">
+            <a:avLst/>
+          </a:prstGeom>
+        </p:spPr>
+        <p:txBody>
+          <a:bodyPr wrap="square">
+            <a:spAutoFit/>
+          </a:bodyPr>
+          <a:lstStyle/>
+          <a:p>
+            <a:r>
+              <a:rPr lang="en-US" dirty="0"/>
+              <a:t>Layout that allows the user to swipe left and right through "pages" of content which are usually different fragments. This is a common navigation mode</a:t>
+            </a:r>
+          </a:p>
+        </p:txBody>
+      </p:sp>
+      <p:pic>
+        <p:nvPicPr>
+          <p:cNvPr id="12" name="Picture 11">
+            <a:extLst>
+              <a:ext uri="{FF2B5EF4-FFF2-40B4-BE49-F238E27FC236}">
+                <a16:creationId xmlns:a16="http://schemas.microsoft.com/office/drawing/2014/main" id="{ECD4E2AF-3239-C346-AA29-1EAB8BF4E7CC}"/>
+              </a:ext>
+            </a:extLst>
+          </p:cNvPr>
+          <p:cNvPicPr>
+            <a:picLocks noChangeAspect="1"/>
+          </p:cNvPicPr>
+          <p:nvPr/>
+        </p:nvPicPr>
+        <p:blipFill>
+          <a:blip r:embed="rId2"/>
+          <a:stretch>
+            <a:fillRect/>
+          </a:stretch>
+        </p:blipFill>
+        <p:spPr>
+          <a:xfrm>
+            <a:off x="5998076" y="999557"/>
+            <a:ext cx="2730500" cy="3644900"/>
+          </a:xfrm>
+          <a:prstGeom prst="rect">
+            <a:avLst/>
+          </a:prstGeom>
+        </p:spPr>
+      </p:pic>
     </p:spTree>
     <p:extLst>
       <p:ext uri="{BB962C8B-B14F-4D97-AF65-F5344CB8AC3E}">
-        <p14:creationId xmlns:p14="http://schemas.microsoft.com/office/powerpoint/2010/main" val="743321816"/>
+        <p14:creationId xmlns:p14="http://schemas.microsoft.com/office/powerpoint/2010/main" val="920000826"/>
       </p:ext>
     </p:extLst>
   </p:cSld>
@@ -22812,10 +22654,10 @@
       </p:grpSpPr>
       <p:sp>
         <p:nvSpPr>
-          <p:cNvPr id="3" name="Date Placeholder 2">
-            <a:extLst>
-              <a:ext uri="{FF2B5EF4-FFF2-40B4-BE49-F238E27FC236}">
-                <a16:creationId xmlns:a16="http://schemas.microsoft.com/office/drawing/2014/main" id="{38EA1B8A-0341-8A42-874E-D4DE268E665D}"/>
+          <p:cNvPr id="3" name="Content Placeholder 2">
+            <a:extLst>
+              <a:ext uri="{FF2B5EF4-FFF2-40B4-BE49-F238E27FC236}">
+                <a16:creationId xmlns:a16="http://schemas.microsoft.com/office/drawing/2014/main" id="{EAF4ED4B-25A2-3241-90A5-8557427EA705}"/>
               </a:ext>
             </a:extLst>
           </p:cNvPr>
@@ -22823,17 +22665,84 @@
             <a:spLocks noGrp="1"/>
           </p:cNvSpPr>
           <p:nvPr>
-            <p:ph type="dt" sz="half" idx="16"/>
-          </p:nvPr>
-        </p:nvSpPr>
-        <p:spPr/>
+            <p:ph idx="15"/>
+          </p:nvPr>
+        </p:nvSpPr>
+        <p:spPr>
+          <a:xfrm>
+            <a:off x="648274" y="1681163"/>
+            <a:ext cx="6792054" cy="2825475"/>
+          </a:xfrm>
+        </p:spPr>
         <p:txBody>
           <a:bodyPr/>
           <a:lstStyle/>
           <a:p>
-            <a:fld id="{7DD0C667-8BB3-D74C-86FC-7D0CD1167351}" type="datetime1">
+            <a:pPr marL="342900" indent="-342900">
+              <a:buFont typeface="+mj-lt"/>
+              <a:buAutoNum type="arabicPeriod"/>
+            </a:pPr>
+            <a:r>
+              <a:rPr lang="en-US" dirty="0"/>
+              <a:t>Add a </a:t>
+            </a:r>
+            <a:r>
+              <a:rPr lang="en-US" dirty="0" err="1"/>
+              <a:t>TabLayout</a:t>
+            </a:r>
+            <a:endParaRPr lang="en-US" dirty="0"/>
+          </a:p>
+          <a:p>
+            <a:pPr marL="342900" indent="-342900">
+              <a:buFont typeface="+mj-lt"/>
+              <a:buAutoNum type="arabicPeriod"/>
+            </a:pPr>
+            <a:r>
+              <a:rPr lang="en-US" dirty="0"/>
+              <a:t>Add a </a:t>
+            </a:r>
+            <a:r>
+              <a:rPr lang="en-US" dirty="0" err="1"/>
+              <a:t>ViewPager</a:t>
+            </a:r>
+            <a:endParaRPr lang="en-US" dirty="0"/>
+          </a:p>
+          <a:p>
+            <a:pPr marL="342900" indent="-342900">
+              <a:buFont typeface="+mj-lt"/>
+              <a:buAutoNum type="arabicPeriod"/>
+            </a:pPr>
+            <a:r>
+              <a:rPr lang="en-US" dirty="0"/>
+              <a:t>Define Fragments</a:t>
+            </a:r>
+          </a:p>
+        </p:txBody>
+      </p:sp>
+      <p:sp>
+        <p:nvSpPr>
+          <p:cNvPr id="4" name="Date Placeholder 3">
+            <a:extLst>
+              <a:ext uri="{FF2B5EF4-FFF2-40B4-BE49-F238E27FC236}">
+                <a16:creationId xmlns:a16="http://schemas.microsoft.com/office/drawing/2014/main" id="{BD21C7C5-5DF1-174B-8FD3-30B37E0ABE3D}"/>
+              </a:ext>
+            </a:extLst>
+          </p:cNvPr>
+          <p:cNvSpPr>
+            <a:spLocks noGrp="1"/>
+          </p:cNvSpPr>
+          <p:nvPr>
+            <p:ph type="dt" sz="half" idx="16"/>
+          </p:nvPr>
+        </p:nvSpPr>
+        <p:spPr/>
+        <p:txBody>
+          <a:bodyPr/>
+          <a:lstStyle/>
+          <a:p>
+            <a:fld id="{AAC8EB75-20B8-FA41-8A25-CB9D4F4E068B}" type="datetime1">
               <a:rPr lang="en-IN" smtClean="0"/>
-              <a:t>27/06/19</a:t>
+              <a:t>28/06/19</a:t>
             </a:fld>
             <a:endParaRPr lang="en-IN" dirty="0"/>
           </a:p>
@@ -22844,7 +22753,7 @@
           <p:cNvPr id="5" name="Slide Number Placeholder 4">
             <a:extLst>
               <a:ext uri="{FF2B5EF4-FFF2-40B4-BE49-F238E27FC236}">
-                <a16:creationId xmlns:a16="http://schemas.microsoft.com/office/drawing/2014/main" id="{5E51FB69-4340-8F4D-90AA-90A140B31F98}"/>
+                <a16:creationId xmlns:a16="http://schemas.microsoft.com/office/drawing/2014/main" id="{FB1FBA0B-68B6-0047-B941-BDA20BFBF764}"/>
               </a:ext>
             </a:extLst>
           </p:cNvPr>
@@ -22870,10 +22779,10 @@
       </p:sp>
       <p:sp>
         <p:nvSpPr>
-          <p:cNvPr id="8" name="Title 7">
-            <a:extLst>
-              <a:ext uri="{FF2B5EF4-FFF2-40B4-BE49-F238E27FC236}">
-                <a16:creationId xmlns:a16="http://schemas.microsoft.com/office/drawing/2014/main" id="{41720887-7F05-D040-986B-5A00E5BD1FC0}"/>
+          <p:cNvPr id="6" name="Title 5">
+            <a:extLst>
+              <a:ext uri="{FF2B5EF4-FFF2-40B4-BE49-F238E27FC236}">
+                <a16:creationId xmlns:a16="http://schemas.microsoft.com/office/drawing/2014/main" id="{1F6E9AA0-F0D7-E54A-8C49-F0B66D62DC42}"/>
               </a:ext>
             </a:extLst>
           </p:cNvPr>
@@ -22884,87 +22793,40 @@
             <p:ph type="title"/>
           </p:nvPr>
         </p:nvSpPr>
-        <p:spPr/>
+        <p:spPr>
+          <a:xfrm>
+            <a:off x="316679" y="121966"/>
+            <a:ext cx="5304475" cy="382564"/>
+          </a:xfrm>
+        </p:spPr>
         <p:txBody>
           <a:bodyPr/>
           <a:lstStyle/>
           <a:p>
             <a:r>
+              <a:rPr lang="en-US" dirty="0"/>
+              <a:t>Building a </a:t>
+            </a:r>
+            <a:r>
               <a:rPr lang="en-US" dirty="0" err="1"/>
-              <a:t>ViewPager</a:t>
+              <a:t>Whatsapp</a:t>
+            </a:r>
+            <a:r>
+              <a:rPr lang="en-US" dirty="0"/>
+              <a:t> </a:t>
+            </a:r>
+            <a:r>
+              <a:rPr lang="en-US" dirty="0" err="1"/>
+              <a:t>Viewpager</a:t>
             </a:r>
             <a:endParaRPr lang="en-US" dirty="0"/>
           </a:p>
         </p:txBody>
       </p:sp>
-      <p:sp>
-        <p:nvSpPr>
-          <p:cNvPr id="11" name="Rectangle 10">
-            <a:extLst>
-              <a:ext uri="{FF2B5EF4-FFF2-40B4-BE49-F238E27FC236}">
-                <a16:creationId xmlns:a16="http://schemas.microsoft.com/office/drawing/2014/main" id="{D59BB89E-D5CA-0442-8CA8-AA9A69CD0B81}"/>
-              </a:ext>
-            </a:extLst>
-          </p:cNvPr>
-          <p:cNvSpPr/>
-          <p:nvPr/>
-        </p:nvSpPr>
-        <p:spPr>
-          <a:xfrm>
-            <a:off x="316679" y="912807"/>
-            <a:ext cx="5885848" cy="923330"/>
-          </a:xfrm>
-          <a:prstGeom prst="rect">
-            <a:avLst/>
-          </a:prstGeom>
-        </p:spPr>
-        <p:txBody>
-          <a:bodyPr wrap="square">
-            <a:spAutoFit/>
-          </a:bodyPr>
-          <a:lstStyle/>
-          <a:p>
-            <a:r>
-              <a:rPr lang="en-US" dirty="0"/>
-              <a:t>Layout that allows the user to swipe left and right through "pages" of content which are usually different fragments. This is a common navigation mode</a:t>
-            </a:r>
-          </a:p>
-        </p:txBody>
-      </p:sp>
-      <p:pic>
-        <p:nvPicPr>
-          <p:cNvPr id="12" name="Picture 11">
-            <a:extLst>
-              <a:ext uri="{FF2B5EF4-FFF2-40B4-BE49-F238E27FC236}">
-                <a16:creationId xmlns:a16="http://schemas.microsoft.com/office/drawing/2014/main" id="{ECD4E2AF-3239-C346-AA29-1EAB8BF4E7CC}"/>
-              </a:ext>
-            </a:extLst>
-          </p:cNvPr>
-          <p:cNvPicPr>
-            <a:picLocks noChangeAspect="1"/>
-          </p:cNvPicPr>
-          <p:nvPr/>
-        </p:nvPicPr>
-        <p:blipFill>
-          <a:blip r:embed="rId2"/>
-          <a:stretch>
-            <a:fillRect/>
-          </a:stretch>
-        </p:blipFill>
-        <p:spPr>
-          <a:xfrm>
-            <a:off x="5998076" y="999557"/>
-            <a:ext cx="2730500" cy="3644900"/>
-          </a:xfrm>
-          <a:prstGeom prst="rect">
-            <a:avLst/>
-          </a:prstGeom>
-        </p:spPr>
-      </p:pic>
     </p:spTree>
     <p:extLst>
       <p:ext uri="{BB962C8B-B14F-4D97-AF65-F5344CB8AC3E}">
-        <p14:creationId xmlns:p14="http://schemas.microsoft.com/office/powerpoint/2010/main" val="920000826"/>
+        <p14:creationId xmlns:p14="http://schemas.microsoft.com/office/powerpoint/2010/main" val="1733410986"/>
       </p:ext>
     </p:extLst>
   </p:cSld>
@@ -22993,10 +22855,10 @@
       </p:grpSpPr>
       <p:sp>
         <p:nvSpPr>
-          <p:cNvPr id="3" name="Content Placeholder 2">
-            <a:extLst>
-              <a:ext uri="{FF2B5EF4-FFF2-40B4-BE49-F238E27FC236}">
-                <a16:creationId xmlns:a16="http://schemas.microsoft.com/office/drawing/2014/main" id="{EAF4ED4B-25A2-3241-90A5-8557427EA705}"/>
+          <p:cNvPr id="7" name="Title 6">
+            <a:extLst>
+              <a:ext uri="{FF2B5EF4-FFF2-40B4-BE49-F238E27FC236}">
+                <a16:creationId xmlns:a16="http://schemas.microsoft.com/office/drawing/2014/main" id="{106A37A9-57E5-744E-9606-B56B8D2CC94D}"/>
               </a:ext>
             </a:extLst>
           </p:cNvPr>
@@ -23004,41 +22866,22 @@
             <a:spLocks noGrp="1"/>
           </p:cNvSpPr>
           <p:nvPr>
-            <p:ph idx="15"/>
-          </p:nvPr>
-        </p:nvSpPr>
-        <p:spPr>
-          <a:xfrm>
-            <a:off x="648274" y="1681163"/>
-            <a:ext cx="6792054" cy="2825475"/>
+            <p:ph type="title"/>
+          </p:nvPr>
+        </p:nvSpPr>
+        <p:spPr>
+          <a:xfrm>
+            <a:off x="2314659" y="2421425"/>
+            <a:ext cx="5990568" cy="562407"/>
           </a:xfrm>
         </p:spPr>
         <p:txBody>
           <a:bodyPr/>
           <a:lstStyle/>
           <a:p>
-            <a:pPr marL="342900" indent="-342900">
-              <a:buFont typeface="+mj-lt"/>
-              <a:buAutoNum type="arabicPeriod"/>
-            </a:pPr>
             <a:r>
               <a:rPr lang="en-US" dirty="0"/>
-              <a:t>Add a </a:t>
-            </a:r>
-            <a:r>
-              <a:rPr lang="en-US" dirty="0" err="1"/>
-              <a:t>TabLayout</a:t>
-            </a:r>
-            <a:endParaRPr lang="en-US" dirty="0"/>
-          </a:p>
-          <a:p>
-            <a:pPr marL="342900" indent="-342900">
-              <a:buFont typeface="+mj-lt"/>
-              <a:buAutoNum type="arabicPeriod"/>
-            </a:pPr>
-            <a:r>
-              <a:rPr lang="en-US" dirty="0"/>
-              <a:t>Add a </a:t>
+              <a:t>Demo </a:t>
             </a:r>
             <a:r>
               <a:rPr lang="en-US" dirty="0" err="1"/>
@@ -23046,16 +22889,6 @@
             </a:r>
             <a:endParaRPr lang="en-US" dirty="0"/>
           </a:p>
-          <a:p>
-            <a:pPr marL="342900" indent="-342900">
-              <a:buFont typeface="+mj-lt"/>
-              <a:buAutoNum type="arabicPeriod"/>
-            </a:pPr>
-            <a:r>
-              <a:rPr lang="en-US" dirty="0"/>
-              <a:t>Define Fragments</a:t>
-            </a:r>
-          </a:p>
         </p:txBody>
       </p:sp>
       <p:sp>
@@ -23063,7 +22896,7 @@
           <p:cNvPr id="4" name="Date Placeholder 3">
             <a:extLst>
               <a:ext uri="{FF2B5EF4-FFF2-40B4-BE49-F238E27FC236}">
-                <a16:creationId xmlns:a16="http://schemas.microsoft.com/office/drawing/2014/main" id="{BD21C7C5-5DF1-174B-8FD3-30B37E0ABE3D}"/>
+                <a16:creationId xmlns:a16="http://schemas.microsoft.com/office/drawing/2014/main" id="{CEC6DFF6-BC0C-5245-A571-2FD90FDF9646}"/>
               </a:ext>
             </a:extLst>
           </p:cNvPr>
@@ -23071,7 +22904,7 @@
             <a:spLocks noGrp="1"/>
           </p:cNvSpPr>
           <p:nvPr>
-            <p:ph type="dt" sz="half" idx="16"/>
+            <p:ph type="dt" sz="half" idx="10"/>
           </p:nvPr>
         </p:nvSpPr>
         <p:spPr/>
@@ -23081,7 +22914,7 @@
           <a:p>
             <a:fld id="{AAC8EB75-20B8-FA41-8A25-CB9D4F4E068B}" type="datetime1">
               <a:rPr lang="en-IN" smtClean="0"/>
-              <a:t>27/06/19</a:t>
+              <a:t>28/06/19</a:t>
             </a:fld>
             <a:endParaRPr lang="en-IN" dirty="0"/>
           </a:p>
@@ -23092,7 +22925,7 @@
           <p:cNvPr id="5" name="Slide Number Placeholder 4">
             <a:extLst>
               <a:ext uri="{FF2B5EF4-FFF2-40B4-BE49-F238E27FC236}">
-                <a16:creationId xmlns:a16="http://schemas.microsoft.com/office/drawing/2014/main" id="{FB1FBA0B-68B6-0047-B941-BDA20BFBF764}"/>
+                <a16:creationId xmlns:a16="http://schemas.microsoft.com/office/drawing/2014/main" id="{A49DAD10-EAB3-E241-9413-99E41761D334}"/>
               </a:ext>
             </a:extLst>
           </p:cNvPr>
@@ -23116,56 +22949,10 @@
           </a:p>
         </p:txBody>
       </p:sp>
-      <p:sp>
-        <p:nvSpPr>
-          <p:cNvPr id="6" name="Title 5">
-            <a:extLst>
-              <a:ext uri="{FF2B5EF4-FFF2-40B4-BE49-F238E27FC236}">
-                <a16:creationId xmlns:a16="http://schemas.microsoft.com/office/drawing/2014/main" id="{1F6E9AA0-F0D7-E54A-8C49-F0B66D62DC42}"/>
-              </a:ext>
-            </a:extLst>
-          </p:cNvPr>
-          <p:cNvSpPr>
-            <a:spLocks noGrp="1"/>
-          </p:cNvSpPr>
-          <p:nvPr>
-            <p:ph type="title"/>
-          </p:nvPr>
-        </p:nvSpPr>
-        <p:spPr>
-          <a:xfrm>
-            <a:off x="316679" y="121966"/>
-            <a:ext cx="5304475" cy="382564"/>
-          </a:xfrm>
-        </p:spPr>
-        <p:txBody>
-          <a:bodyPr/>
-          <a:lstStyle/>
-          <a:p>
-            <a:r>
-              <a:rPr lang="en-US" dirty="0"/>
-              <a:t>Building a </a:t>
-            </a:r>
-            <a:r>
-              <a:rPr lang="en-US" dirty="0" err="1"/>
-              <a:t>Whatsapp</a:t>
-            </a:r>
-            <a:r>
-              <a:rPr lang="en-US" dirty="0"/>
-              <a:t> </a:t>
-            </a:r>
-            <a:r>
-              <a:rPr lang="en-US" dirty="0" err="1"/>
-              <a:t>Viewpager</a:t>
-            </a:r>
-            <a:endParaRPr lang="en-US" dirty="0"/>
-          </a:p>
-        </p:txBody>
-      </p:sp>
     </p:spTree>
     <p:extLst>
       <p:ext uri="{BB962C8B-B14F-4D97-AF65-F5344CB8AC3E}">
-        <p14:creationId xmlns:p14="http://schemas.microsoft.com/office/powerpoint/2010/main" val="1733410986"/>
+        <p14:creationId xmlns:p14="http://schemas.microsoft.com/office/powerpoint/2010/main" val="2619983813"/>
       </p:ext>
     </p:extLst>
   </p:cSld>
@@ -23194,10 +22981,10 @@
       </p:grpSpPr>
       <p:sp>
         <p:nvSpPr>
-          <p:cNvPr id="7" name="Title 6">
-            <a:extLst>
-              <a:ext uri="{FF2B5EF4-FFF2-40B4-BE49-F238E27FC236}">
-                <a16:creationId xmlns:a16="http://schemas.microsoft.com/office/drawing/2014/main" id="{106A37A9-57E5-744E-9606-B56B8D2CC94D}"/>
+          <p:cNvPr id="8" name="Content Placeholder 7">
+            <a:extLst>
+              <a:ext uri="{FF2B5EF4-FFF2-40B4-BE49-F238E27FC236}">
+                <a16:creationId xmlns:a16="http://schemas.microsoft.com/office/drawing/2014/main" id="{5914A8C2-522E-3E40-85F8-012DE49FEAA1}"/>
               </a:ext>
             </a:extLst>
           </p:cNvPr>
@@ -23205,13 +22992,13 @@
             <a:spLocks noGrp="1"/>
           </p:cNvSpPr>
           <p:nvPr>
-            <p:ph type="title"/>
-          </p:nvPr>
-        </p:nvSpPr>
-        <p:spPr>
-          <a:xfrm>
-            <a:off x="2314659" y="2421425"/>
-            <a:ext cx="5990568" cy="562407"/>
+            <p:ph idx="15"/>
+          </p:nvPr>
+        </p:nvSpPr>
+        <p:spPr>
+          <a:xfrm>
+            <a:off x="125128" y="741145"/>
+            <a:ext cx="8835992" cy="3765493"/>
           </a:xfrm>
         </p:spPr>
         <p:txBody>
@@ -23220,22 +23007,65 @@
           <a:p>
             <a:r>
               <a:rPr lang="en-US" dirty="0"/>
-              <a:t>Demo </a:t>
+              <a:t>A notification is a message you can display to the user outside of your application's normal UI. Notifications appear in the phone's notification area and then can be expanded to see more information.</a:t>
             </a:r>
+          </a:p>
+          <a:p>
             <a:r>
-              <a:rPr lang="en-US" dirty="0" err="1"/>
-              <a:t>ViewPager</a:t>
+              <a:rPr lang="en-US" dirty="0"/>
+              <a:t>This is typically used to keep the user informed about events that are coming in that they should be aware of such as new email messages, new chat messages or an upcoming calendar event.</a:t>
             </a:r>
+          </a:p>
+          <a:p>
+            <a:r>
+              <a:rPr lang="en-US" dirty="0"/>
+              <a:t>Notifications can include actions that let the user take a relevant action from within the notification drawer. At the minimum, all notifications consist of a base layout including:</a:t>
+            </a:r>
+          </a:p>
+          <a:p>
+            <a:pPr marL="285750" indent="-285750" algn="l">
+              <a:buFont typeface="Arial" panose="020B0604020202020204" pitchFamily="34" charset="0"/>
+              <a:buChar char="•"/>
+            </a:pPr>
+            <a:r>
+              <a:rPr lang="en-US" dirty="0"/>
+              <a:t>Icon of the app or relevant user image</a:t>
+            </a:r>
+          </a:p>
+          <a:p>
+            <a:pPr marL="285750" indent="-285750" algn="l">
+              <a:buFont typeface="Arial" panose="020B0604020202020204" pitchFamily="34" charset="0"/>
+              <a:buChar char="•"/>
+            </a:pPr>
+            <a:r>
+              <a:rPr lang="en-US" dirty="0"/>
+              <a:t>Title and message</a:t>
+            </a:r>
+          </a:p>
+          <a:p>
+            <a:pPr marL="285750" indent="-285750" algn="l">
+              <a:buFont typeface="Arial" panose="020B0604020202020204" pitchFamily="34" charset="0"/>
+              <a:buChar char="•"/>
+            </a:pPr>
+            <a:r>
+              <a:rPr lang="en-US" dirty="0"/>
+              <a:t>Timestamp</a:t>
+            </a:r>
+          </a:p>
+          <a:p>
+            <a:br>
+              <a:rPr lang="en-US" dirty="0"/>
+            </a:br>
             <a:endParaRPr lang="en-US" dirty="0"/>
           </a:p>
         </p:txBody>
       </p:sp>
       <p:sp>
         <p:nvSpPr>
-          <p:cNvPr id="4" name="Date Placeholder 3">
-            <a:extLst>
-              <a:ext uri="{FF2B5EF4-FFF2-40B4-BE49-F238E27FC236}">
-                <a16:creationId xmlns:a16="http://schemas.microsoft.com/office/drawing/2014/main" id="{CEC6DFF6-BC0C-5245-A571-2FD90FDF9646}"/>
+          <p:cNvPr id="3" name="Date Placeholder 2">
+            <a:extLst>
+              <a:ext uri="{FF2B5EF4-FFF2-40B4-BE49-F238E27FC236}">
+                <a16:creationId xmlns:a16="http://schemas.microsoft.com/office/drawing/2014/main" id="{712C2436-F743-D140-8C94-34C669B42EC5}"/>
               </a:ext>
             </a:extLst>
           </p:cNvPr>
@@ -23243,7 +23073,7 @@
             <a:spLocks noGrp="1"/>
           </p:cNvSpPr>
           <p:nvPr>
-            <p:ph type="dt" sz="half" idx="10"/>
+            <p:ph type="dt" sz="half" idx="16"/>
           </p:nvPr>
         </p:nvSpPr>
         <p:spPr/>
@@ -23251,9 +23081,9 @@
           <a:bodyPr/>
           <a:lstStyle/>
           <a:p>
-            <a:fld id="{AAC8EB75-20B8-FA41-8A25-CB9D4F4E068B}" type="datetime1">
+            <a:fld id="{7DD0C667-8BB3-D74C-86FC-7D0CD1167351}" type="datetime1">
               <a:rPr lang="en-IN" smtClean="0"/>
-              <a:t>27/06/19</a:t>
+              <a:t>28/06/19</a:t>
             </a:fld>
             <a:endParaRPr lang="en-IN" dirty="0"/>
           </a:p>
@@ -23264,7 +23094,7 @@
           <p:cNvPr id="5" name="Slide Number Placeholder 4">
             <a:extLst>
               <a:ext uri="{FF2B5EF4-FFF2-40B4-BE49-F238E27FC236}">
-                <a16:creationId xmlns:a16="http://schemas.microsoft.com/office/drawing/2014/main" id="{A49DAD10-EAB3-E241-9413-99E41761D334}"/>
+                <a16:creationId xmlns:a16="http://schemas.microsoft.com/office/drawing/2014/main" id="{D9A16354-62D5-794E-9190-9DD32FE76EA5}"/>
               </a:ext>
             </a:extLst>
           </p:cNvPr>
@@ -23288,10 +23118,38 @@
           </a:p>
         </p:txBody>
       </p:sp>
+      <p:sp>
+        <p:nvSpPr>
+          <p:cNvPr id="6" name="Title 5">
+            <a:extLst>
+              <a:ext uri="{FF2B5EF4-FFF2-40B4-BE49-F238E27FC236}">
+                <a16:creationId xmlns:a16="http://schemas.microsoft.com/office/drawing/2014/main" id="{76D86FAA-10DD-8742-985B-D4B4D1CE4F50}"/>
+              </a:ext>
+            </a:extLst>
+          </p:cNvPr>
+          <p:cNvSpPr>
+            <a:spLocks noGrp="1"/>
+          </p:cNvSpPr>
+          <p:nvPr>
+            <p:ph type="title"/>
+          </p:nvPr>
+        </p:nvSpPr>
+        <p:spPr/>
+        <p:txBody>
+          <a:bodyPr/>
+          <a:lstStyle/>
+          <a:p>
+            <a:r>
+              <a:rPr lang="en-US" dirty="0"/>
+              <a:t>Notifications</a:t>
+            </a:r>
+          </a:p>
+        </p:txBody>
+      </p:sp>
     </p:spTree>
     <p:extLst>
       <p:ext uri="{BB962C8B-B14F-4D97-AF65-F5344CB8AC3E}">
-        <p14:creationId xmlns:p14="http://schemas.microsoft.com/office/powerpoint/2010/main" val="2619983813"/>
+        <p14:creationId xmlns:p14="http://schemas.microsoft.com/office/powerpoint/2010/main" val="639974575"/>
       </p:ext>
     </p:extLst>
   </p:cSld>
@@ -23320,10 +23178,10 @@
       </p:grpSpPr>
       <p:sp>
         <p:nvSpPr>
-          <p:cNvPr id="8" name="Content Placeholder 7">
-            <a:extLst>
-              <a:ext uri="{FF2B5EF4-FFF2-40B4-BE49-F238E27FC236}">
-                <a16:creationId xmlns:a16="http://schemas.microsoft.com/office/drawing/2014/main" id="{5914A8C2-522E-3E40-85F8-012DE49FEAA1}"/>
+          <p:cNvPr id="3" name="Content Placeholder 2">
+            <a:extLst>
+              <a:ext uri="{FF2B5EF4-FFF2-40B4-BE49-F238E27FC236}">
+                <a16:creationId xmlns:a16="http://schemas.microsoft.com/office/drawing/2014/main" id="{B3B1AE08-FBCF-B647-B458-87F3824A5471}"/>
               </a:ext>
             </a:extLst>
           </p:cNvPr>
@@ -23336,8 +23194,8 @@
         </p:nvSpPr>
         <p:spPr>
           <a:xfrm>
-            <a:off x="125128" y="741145"/>
-            <a:ext cx="8835992" cy="3765493"/>
+            <a:off x="185888" y="795639"/>
+            <a:ext cx="8515350" cy="609649"/>
           </a:xfrm>
         </p:spPr>
         <p:txBody>
@@ -23346,65 +23204,25 @@
           <a:p>
             <a:r>
               <a:rPr lang="en-US" dirty="0"/>
-              <a:t>A notification is a message you can display to the user outside of your application's normal UI. Notifications appear in the phone's notification area and then can be expanded to see more information.</a:t>
+              <a:t>Let's build a basic notification using the </a:t>
             </a:r>
-          </a:p>
-          <a:p>
+            <a:r>
+              <a:rPr lang="en-US" dirty="0" err="1"/>
+              <a:t>NotificationCompat.Builder</a:t>
+            </a:r>
             <a:r>
               <a:rPr lang="en-US" dirty="0"/>
-              <a:t>This is typically used to keep the user informed about events that are coming in that they should be aware of such as new email messages, new chat messages or an upcoming calendar event.</a:t>
+              <a:t>. Typically this will contain at least an icon, a title, body</a:t>
             </a:r>
           </a:p>
-          <a:p>
-            <a:r>
-              <a:rPr lang="en-US" dirty="0"/>
-              <a:t>Notifications can include actions that let the user take a relevant action from within the notification drawer. At the minimum, all notifications consist of a base layout including:</a:t>
-            </a:r>
-          </a:p>
-          <a:p>
-            <a:pPr marL="285750" indent="-285750" algn="l">
-              <a:buFont typeface="Arial" panose="020B0604020202020204" pitchFamily="34" charset="0"/>
-              <a:buChar char="•"/>
-            </a:pPr>
-            <a:r>
-              <a:rPr lang="en-US" dirty="0"/>
-              <a:t>Icon of the app or relevant user image</a:t>
-            </a:r>
-          </a:p>
-          <a:p>
-            <a:pPr marL="285750" indent="-285750" algn="l">
-              <a:buFont typeface="Arial" panose="020B0604020202020204" pitchFamily="34" charset="0"/>
-              <a:buChar char="•"/>
-            </a:pPr>
-            <a:r>
-              <a:rPr lang="en-US" dirty="0"/>
-              <a:t>Title and message</a:t>
-            </a:r>
-          </a:p>
-          <a:p>
-            <a:pPr marL="285750" indent="-285750" algn="l">
-              <a:buFont typeface="Arial" panose="020B0604020202020204" pitchFamily="34" charset="0"/>
-              <a:buChar char="•"/>
-            </a:pPr>
-            <a:r>
-              <a:rPr lang="en-US" dirty="0"/>
-              <a:t>Timestamp</a:t>
-            </a:r>
-          </a:p>
-          <a:p>
-            <a:br>
-              <a:rPr lang="en-US" dirty="0"/>
-            </a:br>
-            <a:endParaRPr lang="en-US" dirty="0"/>
-          </a:p>
-        </p:txBody>
-      </p:sp>
-      <p:sp>
-        <p:nvSpPr>
-          <p:cNvPr id="3" name="Date Placeholder 2">
-            <a:extLst>
-              <a:ext uri="{FF2B5EF4-FFF2-40B4-BE49-F238E27FC236}">
-                <a16:creationId xmlns:a16="http://schemas.microsoft.com/office/drawing/2014/main" id="{712C2436-F743-D140-8C94-34C669B42EC5}"/>
+        </p:txBody>
+      </p:sp>
+      <p:sp>
+        <p:nvSpPr>
+          <p:cNvPr id="4" name="Date Placeholder 3">
+            <a:extLst>
+              <a:ext uri="{FF2B5EF4-FFF2-40B4-BE49-F238E27FC236}">
+                <a16:creationId xmlns:a16="http://schemas.microsoft.com/office/drawing/2014/main" id="{796A38AF-6FFF-7346-81AE-F73095486018}"/>
               </a:ext>
             </a:extLst>
           </p:cNvPr>
@@ -23420,9 +23238,9 @@
           <a:bodyPr/>
           <a:lstStyle/>
           <a:p>
-            <a:fld id="{7DD0C667-8BB3-D74C-86FC-7D0CD1167351}" type="datetime1">
+            <a:fld id="{AAC8EB75-20B8-FA41-8A25-CB9D4F4E068B}" type="datetime1">
               <a:rPr lang="en-IN" smtClean="0"/>
-              <a:t>27/06/19</a:t>
+              <a:t>28/06/19</a:t>
             </a:fld>
             <a:endParaRPr lang="en-IN" dirty="0"/>
           </a:p>
@@ -23433,7 +23251,7 @@
           <p:cNvPr id="5" name="Slide Number Placeholder 4">
             <a:extLst>
               <a:ext uri="{FF2B5EF4-FFF2-40B4-BE49-F238E27FC236}">
-                <a16:creationId xmlns:a16="http://schemas.microsoft.com/office/drawing/2014/main" id="{D9A16354-62D5-794E-9190-9DD32FE76EA5}"/>
+                <a16:creationId xmlns:a16="http://schemas.microsoft.com/office/drawing/2014/main" id="{6B1C5EE6-01C1-584E-97D1-9CF4EEDC4985}"/>
               </a:ext>
             </a:extLst>
           </p:cNvPr>
@@ -23462,7 +23280,7 @@
           <p:cNvPr id="6" name="Title 5">
             <a:extLst>
               <a:ext uri="{FF2B5EF4-FFF2-40B4-BE49-F238E27FC236}">
-                <a16:creationId xmlns:a16="http://schemas.microsoft.com/office/drawing/2014/main" id="{76D86FAA-10DD-8742-985B-D4B4D1CE4F50}"/>
+                <a16:creationId xmlns:a16="http://schemas.microsoft.com/office/drawing/2014/main" id="{40523DA6-7DD4-154D-9759-96574BBBCE3D}"/>
               </a:ext>
             </a:extLst>
           </p:cNvPr>
@@ -23480,15 +23298,75 @@
           <a:p>
             <a:r>
               <a:rPr lang="en-US" dirty="0"/>
-              <a:t>Notifications</a:t>
+              <a:t>Creating a Notification</a:t>
             </a:r>
           </a:p>
         </p:txBody>
       </p:sp>
+      <p:pic>
+        <p:nvPicPr>
+          <p:cNvPr id="7" name="Picture 6">
+            <a:extLst>
+              <a:ext uri="{FF2B5EF4-FFF2-40B4-BE49-F238E27FC236}">
+                <a16:creationId xmlns:a16="http://schemas.microsoft.com/office/drawing/2014/main" id="{A6E4B666-0CF3-BE49-8974-FBE3EA098238}"/>
+              </a:ext>
+            </a:extLst>
+          </p:cNvPr>
+          <p:cNvPicPr>
+            <a:picLocks noChangeAspect="1"/>
+          </p:cNvPicPr>
+          <p:nvPr/>
+        </p:nvPicPr>
+        <p:blipFill>
+          <a:blip r:embed="rId2"/>
+          <a:stretch>
+            <a:fillRect/>
+          </a:stretch>
+        </p:blipFill>
+        <p:spPr>
+          <a:xfrm>
+            <a:off x="0" y="1405288"/>
+            <a:ext cx="9144000" cy="1604019"/>
+          </a:xfrm>
+          <a:prstGeom prst="rect">
+            <a:avLst/>
+          </a:prstGeom>
+        </p:spPr>
+      </p:pic>
+      <p:pic>
+        <p:nvPicPr>
+          <p:cNvPr id="8" name="Picture 7">
+            <a:extLst>
+              <a:ext uri="{FF2B5EF4-FFF2-40B4-BE49-F238E27FC236}">
+                <a16:creationId xmlns:a16="http://schemas.microsoft.com/office/drawing/2014/main" id="{C5F4A733-0E43-5740-803C-F832C72BDCA8}"/>
+              </a:ext>
+            </a:extLst>
+          </p:cNvPr>
+          <p:cNvPicPr>
+            <a:picLocks noChangeAspect="1"/>
+          </p:cNvPicPr>
+          <p:nvPr/>
+        </p:nvPicPr>
+        <p:blipFill>
+          <a:blip r:embed="rId3"/>
+          <a:stretch>
+            <a:fillRect/>
+          </a:stretch>
+        </p:blipFill>
+        <p:spPr>
+          <a:xfrm>
+            <a:off x="134927" y="3163244"/>
+            <a:ext cx="8874146" cy="1253838"/>
+          </a:xfrm>
+          <a:prstGeom prst="rect">
+            <a:avLst/>
+          </a:prstGeom>
+        </p:spPr>
+      </p:pic>
     </p:spTree>
     <p:extLst>
       <p:ext uri="{BB962C8B-B14F-4D97-AF65-F5344CB8AC3E}">
-        <p14:creationId xmlns:p14="http://schemas.microsoft.com/office/powerpoint/2010/main" val="639974575"/>
+        <p14:creationId xmlns:p14="http://schemas.microsoft.com/office/powerpoint/2010/main" val="3317379596"/>
       </p:ext>
     </p:extLst>
   </p:cSld>

</xml_diff>